<commit_message>
Added terraform files updates setup guide
</commit_message>
<xml_diff>
--- a/Student/Guides/Challenges.pptx
+++ b/Student/Guides/Challenges.pptx
@@ -601,7 +601,7 @@
           <a:p>
             <a:fld id="{53D76E38-EB4B-425D-87E0-B33791D2CD91}" type="datetimeFigureOut">
               <a:rPr lang="en-US" smtClean="0"/>
-              <a:t>1/22/2019</a:t>
+              <a:t>1/24/2019</a:t>
             </a:fld>
             <a:endParaRPr lang="en-US"/>
           </a:p>
@@ -1743,7 +1743,7 @@
           <a:p>
             <a:fld id="{3E3C2F32-47E1-4D90-8C64-89D7BCB0B356}" type="datetimeFigureOut">
               <a:rPr lang="en-US" smtClean="0"/>
-              <a:t>1/22/2019</a:t>
+              <a:t>1/24/2019</a:t>
             </a:fld>
             <a:endParaRPr lang="en-US"/>
           </a:p>
@@ -1941,7 +1941,7 @@
           <a:p>
             <a:fld id="{3E3C2F32-47E1-4D90-8C64-89D7BCB0B356}" type="datetimeFigureOut">
               <a:rPr lang="en-US" smtClean="0"/>
-              <a:t>1/22/2019</a:t>
+              <a:t>1/24/2019</a:t>
             </a:fld>
             <a:endParaRPr lang="en-US"/>
           </a:p>
@@ -2149,7 +2149,7 @@
           <a:p>
             <a:fld id="{3E3C2F32-47E1-4D90-8C64-89D7BCB0B356}" type="datetimeFigureOut">
               <a:rPr lang="en-US" smtClean="0"/>
-              <a:t>1/22/2019</a:t>
+              <a:t>1/24/2019</a:t>
             </a:fld>
             <a:endParaRPr lang="en-US"/>
           </a:p>
@@ -2347,7 +2347,7 @@
           <a:p>
             <a:fld id="{3E3C2F32-47E1-4D90-8C64-89D7BCB0B356}" type="datetimeFigureOut">
               <a:rPr lang="en-US" smtClean="0"/>
-              <a:t>1/22/2019</a:t>
+              <a:t>1/24/2019</a:t>
             </a:fld>
             <a:endParaRPr lang="en-US"/>
           </a:p>
@@ -2622,7 +2622,7 @@
           <a:p>
             <a:fld id="{3E3C2F32-47E1-4D90-8C64-89D7BCB0B356}" type="datetimeFigureOut">
               <a:rPr lang="en-US" smtClean="0"/>
-              <a:t>1/22/2019</a:t>
+              <a:t>1/24/2019</a:t>
             </a:fld>
             <a:endParaRPr lang="en-US"/>
           </a:p>
@@ -2887,7 +2887,7 @@
           <a:p>
             <a:fld id="{3E3C2F32-47E1-4D90-8C64-89D7BCB0B356}" type="datetimeFigureOut">
               <a:rPr lang="en-US" smtClean="0"/>
-              <a:t>1/22/2019</a:t>
+              <a:t>1/24/2019</a:t>
             </a:fld>
             <a:endParaRPr lang="en-US"/>
           </a:p>
@@ -3299,7 +3299,7 @@
           <a:p>
             <a:fld id="{3E3C2F32-47E1-4D90-8C64-89D7BCB0B356}" type="datetimeFigureOut">
               <a:rPr lang="en-US" smtClean="0"/>
-              <a:t>1/22/2019</a:t>
+              <a:t>1/24/2019</a:t>
             </a:fld>
             <a:endParaRPr lang="en-US"/>
           </a:p>
@@ -3440,7 +3440,7 @@
           <a:p>
             <a:fld id="{3E3C2F32-47E1-4D90-8C64-89D7BCB0B356}" type="datetimeFigureOut">
               <a:rPr lang="en-US" smtClean="0"/>
-              <a:t>1/22/2019</a:t>
+              <a:t>1/24/2019</a:t>
             </a:fld>
             <a:endParaRPr lang="en-US"/>
           </a:p>
@@ -3553,7 +3553,7 @@
           <a:p>
             <a:fld id="{3E3C2F32-47E1-4D90-8C64-89D7BCB0B356}" type="datetimeFigureOut">
               <a:rPr lang="en-US" smtClean="0"/>
-              <a:t>1/22/2019</a:t>
+              <a:t>1/24/2019</a:t>
             </a:fld>
             <a:endParaRPr lang="en-US"/>
           </a:p>
@@ -3864,7 +3864,7 @@
           <a:p>
             <a:fld id="{3E3C2F32-47E1-4D90-8C64-89D7BCB0B356}" type="datetimeFigureOut">
               <a:rPr lang="en-US" smtClean="0"/>
-              <a:t>1/22/2019</a:t>
+              <a:t>1/24/2019</a:t>
             </a:fld>
             <a:endParaRPr lang="en-US"/>
           </a:p>
@@ -4152,7 +4152,7 @@
           <a:p>
             <a:fld id="{3E3C2F32-47E1-4D90-8C64-89D7BCB0B356}" type="datetimeFigureOut">
               <a:rPr lang="en-US" smtClean="0"/>
-              <a:t>1/22/2019</a:t>
+              <a:t>1/24/2019</a:t>
             </a:fld>
             <a:endParaRPr lang="en-US"/>
           </a:p>
@@ -4393,7 +4393,7 @@
           <a:p>
             <a:fld id="{3E3C2F32-47E1-4D90-8C64-89D7BCB0B356}" type="datetimeFigureOut">
               <a:rPr lang="en-US" smtClean="0"/>
-              <a:t>1/22/2019</a:t>
+              <a:t>1/24/2019</a:t>
             </a:fld>
             <a:endParaRPr lang="en-US"/>
           </a:p>
@@ -6827,7 +6827,7 @@
         <p:spPr>
           <a:xfrm>
             <a:off x="952500" y="1567543"/>
-            <a:ext cx="9312729" cy="3046988"/>
+            <a:ext cx="9312729" cy="3785652"/>
           </a:xfrm>
           <a:prstGeom prst="rect">
             <a:avLst/>
@@ -6858,13 +6858,30 @@
             </a:r>
           </a:p>
           <a:p>
+            <a:pPr marL="742950" lvl="1" indent="-285750">
+              <a:buFont typeface="Arial" panose="020B0604020202020204" pitchFamily="34" charset="0"/>
+              <a:buChar char="•"/>
+            </a:pPr>
+            <a:r>
+              <a:rPr lang="en-US" sz="2400" dirty="0"/>
+              <a:t>Hint: </a:t>
+            </a:r>
+            <a:r>
+              <a:rPr lang="en-US" sz="2400" dirty="0">
+                <a:hlinkClick r:id="rId2"/>
+              </a:rPr>
+              <a:t>https://docs.microsoft.com/en-us/azure/dev-spaces/get-started-netcore-visualstudio</a:t>
+            </a:r>
+            <a:endParaRPr lang="en-US" sz="2400" dirty="0"/>
+          </a:p>
+          <a:p>
             <a:pPr marL="285750" indent="-285750">
               <a:buFont typeface="Arial" panose="020B0604020202020204" pitchFamily="34" charset="0"/>
               <a:buChar char="•"/>
             </a:pPr>
             <a:r>
               <a:rPr lang="en-US" sz="2400" dirty="0"/>
-              <a:t>From Azure Monitor locate the container running the </a:t>
+              <a:t>From Azure Monitor, locate the container running the </a:t>
             </a:r>
             <a:r>
               <a:rPr lang="en-US" sz="2400" dirty="0" err="1"/>
@@ -6897,7 +6914,7 @@
             </a:br>
             <a:r>
               <a:rPr lang="en-US" sz="2400" dirty="0"/>
-              <a:t>Note: Log in and try to change your password</a:t>
+              <a:t>(Hint: Try to change your password)</a:t>
             </a:r>
           </a:p>
           <a:p>
@@ -7053,7 +7070,7 @@
             <a:pPr lvl="1"/>
             <a:r>
               <a:rPr lang="en-US" dirty="0"/>
-              <a:t>Find the exception in App Insights (Tip: try to change your password)</a:t>
+              <a:t>Find the exception in App Insights (Hint: Try to change your password)</a:t>
             </a:r>
           </a:p>
           <a:p>
@@ -7160,9 +7177,23 @@
             </a:r>
           </a:p>
           <a:p>
+            <a:pPr lvl="1"/>
             <a:r>
               <a:rPr lang="en-US" dirty="0"/>
-              <a:t>Configure the Azure Monitor Data Source for Azure Monitor, Log Analytics and App Insights</a:t>
+              <a:t>Hint: </a:t>
+            </a:r>
+            <a:r>
+              <a:rPr lang="en-US" dirty="0">
+                <a:hlinkClick r:id="rId3"/>
+              </a:rPr>
+              <a:t>http://docs.grafana.org/installation/docker/</a:t>
+            </a:r>
+            <a:endParaRPr lang="en-US" dirty="0"/>
+          </a:p>
+          <a:p>
+            <a:r>
+              <a:rPr lang="en-US" dirty="0"/>
+              <a:t>Configure the Azure Monitor Data Source for Azure Monitor, Log Analytics and Application Insights</a:t>
             </a:r>
           </a:p>
           <a:p>

</xml_diff>

<commit_message>
Update documents based on feedback
</commit_message>
<xml_diff>
--- a/Student/Guides/Challenges.pptx
+++ b/Student/Guides/Challenges.pptx
@@ -601,7 +601,7 @@
           <a:p>
             <a:fld id="{53D76E38-EB4B-425D-87E0-B33791D2CD91}" type="datetimeFigureOut">
               <a:rPr lang="en-US" smtClean="0"/>
-              <a:t>1/24/2019</a:t>
+              <a:t>1/28/2019</a:t>
             </a:fld>
             <a:endParaRPr lang="en-US"/>
           </a:p>
@@ -1743,7 +1743,7 @@
           <a:p>
             <a:fld id="{3E3C2F32-47E1-4D90-8C64-89D7BCB0B356}" type="datetimeFigureOut">
               <a:rPr lang="en-US" smtClean="0"/>
-              <a:t>1/24/2019</a:t>
+              <a:t>1/28/2019</a:t>
             </a:fld>
             <a:endParaRPr lang="en-US"/>
           </a:p>
@@ -1941,7 +1941,7 @@
           <a:p>
             <a:fld id="{3E3C2F32-47E1-4D90-8C64-89D7BCB0B356}" type="datetimeFigureOut">
               <a:rPr lang="en-US" smtClean="0"/>
-              <a:t>1/24/2019</a:t>
+              <a:t>1/28/2019</a:t>
             </a:fld>
             <a:endParaRPr lang="en-US"/>
           </a:p>
@@ -2149,7 +2149,7 @@
           <a:p>
             <a:fld id="{3E3C2F32-47E1-4D90-8C64-89D7BCB0B356}" type="datetimeFigureOut">
               <a:rPr lang="en-US" smtClean="0"/>
-              <a:t>1/24/2019</a:t>
+              <a:t>1/28/2019</a:t>
             </a:fld>
             <a:endParaRPr lang="en-US"/>
           </a:p>
@@ -2347,7 +2347,7 @@
           <a:p>
             <a:fld id="{3E3C2F32-47E1-4D90-8C64-89D7BCB0B356}" type="datetimeFigureOut">
               <a:rPr lang="en-US" smtClean="0"/>
-              <a:t>1/24/2019</a:t>
+              <a:t>1/28/2019</a:t>
             </a:fld>
             <a:endParaRPr lang="en-US"/>
           </a:p>
@@ -2622,7 +2622,7 @@
           <a:p>
             <a:fld id="{3E3C2F32-47E1-4D90-8C64-89D7BCB0B356}" type="datetimeFigureOut">
               <a:rPr lang="en-US" smtClean="0"/>
-              <a:t>1/24/2019</a:t>
+              <a:t>1/28/2019</a:t>
             </a:fld>
             <a:endParaRPr lang="en-US"/>
           </a:p>
@@ -2887,7 +2887,7 @@
           <a:p>
             <a:fld id="{3E3C2F32-47E1-4D90-8C64-89D7BCB0B356}" type="datetimeFigureOut">
               <a:rPr lang="en-US" smtClean="0"/>
-              <a:t>1/24/2019</a:t>
+              <a:t>1/28/2019</a:t>
             </a:fld>
             <a:endParaRPr lang="en-US"/>
           </a:p>
@@ -3299,7 +3299,7 @@
           <a:p>
             <a:fld id="{3E3C2F32-47E1-4D90-8C64-89D7BCB0B356}" type="datetimeFigureOut">
               <a:rPr lang="en-US" smtClean="0"/>
-              <a:t>1/24/2019</a:t>
+              <a:t>1/28/2019</a:t>
             </a:fld>
             <a:endParaRPr lang="en-US"/>
           </a:p>
@@ -3440,7 +3440,7 @@
           <a:p>
             <a:fld id="{3E3C2F32-47E1-4D90-8C64-89D7BCB0B356}" type="datetimeFigureOut">
               <a:rPr lang="en-US" smtClean="0"/>
-              <a:t>1/24/2019</a:t>
+              <a:t>1/28/2019</a:t>
             </a:fld>
             <a:endParaRPr lang="en-US"/>
           </a:p>
@@ -3553,7 +3553,7 @@
           <a:p>
             <a:fld id="{3E3C2F32-47E1-4D90-8C64-89D7BCB0B356}" type="datetimeFigureOut">
               <a:rPr lang="en-US" smtClean="0"/>
-              <a:t>1/24/2019</a:t>
+              <a:t>1/28/2019</a:t>
             </a:fld>
             <a:endParaRPr lang="en-US"/>
           </a:p>
@@ -3864,7 +3864,7 @@
           <a:p>
             <a:fld id="{3E3C2F32-47E1-4D90-8C64-89D7BCB0B356}" type="datetimeFigureOut">
               <a:rPr lang="en-US" smtClean="0"/>
-              <a:t>1/24/2019</a:t>
+              <a:t>1/28/2019</a:t>
             </a:fld>
             <a:endParaRPr lang="en-US"/>
           </a:p>
@@ -4152,7 +4152,7 @@
           <a:p>
             <a:fld id="{3E3C2F32-47E1-4D90-8C64-89D7BCB0B356}" type="datetimeFigureOut">
               <a:rPr lang="en-US" smtClean="0"/>
-              <a:t>1/24/2019</a:t>
+              <a:t>1/28/2019</a:t>
             </a:fld>
             <a:endParaRPr lang="en-US"/>
           </a:p>
@@ -4393,7 +4393,7 @@
           <a:p>
             <a:fld id="{3E3C2F32-47E1-4D90-8C64-89D7BCB0B356}" type="datetimeFigureOut">
               <a:rPr lang="en-US" smtClean="0"/>
-              <a:t>1/24/2019</a:t>
+              <a:t>1/28/2019</a:t>
             </a:fld>
             <a:endParaRPr lang="en-US"/>
           </a:p>
@@ -4828,40 +4828,49 @@
         </p:nvSpPr>
         <p:spPr/>
         <p:txBody>
+          <a:bodyPr>
+            <a:normAutofit fontScale="90000"/>
+          </a:bodyPr>
+          <a:lstStyle/>
+          <a:p>
+            <a:r>
+              <a:rPr lang="en-US" dirty="0"/>
+              <a:t>Ready </a:t>
+            </a:r>
+            <a:br>
+              <a:rPr lang="en-US" dirty="0"/>
+            </a:br>
+            <a:r>
+              <a:rPr lang="en-US" dirty="0"/>
+              <a:t>Pre-day Azure Monitoring Workshop</a:t>
+            </a:r>
+          </a:p>
+        </p:txBody>
+      </p:sp>
+      <p:sp>
+        <p:nvSpPr>
+          <p:cNvPr id="3" name="Subtitle 2">
+            <a:extLst>
+              <a:ext uri="{FF2B5EF4-FFF2-40B4-BE49-F238E27FC236}">
+                <a16:creationId xmlns:a16="http://schemas.microsoft.com/office/drawing/2014/main" id="{7ADC68B9-4F78-46EE-BD21-18F8DD128D04}"/>
+              </a:ext>
+            </a:extLst>
+          </p:cNvPr>
+          <p:cNvSpPr>
+            <a:spLocks noGrp="1"/>
+          </p:cNvSpPr>
+          <p:nvPr>
+            <p:ph type="subTitle" idx="1"/>
+          </p:nvPr>
+        </p:nvSpPr>
+        <p:spPr/>
+        <p:txBody>
           <a:bodyPr/>
           <a:lstStyle/>
           <a:p>
             <a:r>
               <a:rPr lang="en-US" dirty="0"/>
-              <a:t>Azure Monitoring Workshop</a:t>
-            </a:r>
-          </a:p>
-        </p:txBody>
-      </p:sp>
-      <p:sp>
-        <p:nvSpPr>
-          <p:cNvPr id="3" name="Subtitle 2">
-            <a:extLst>
-              <a:ext uri="{FF2B5EF4-FFF2-40B4-BE49-F238E27FC236}">
-                <a16:creationId xmlns:a16="http://schemas.microsoft.com/office/drawing/2014/main" id="{7ADC68B9-4F78-46EE-BD21-18F8DD128D04}"/>
-              </a:ext>
-            </a:extLst>
-          </p:cNvPr>
-          <p:cNvSpPr>
-            <a:spLocks noGrp="1"/>
-          </p:cNvSpPr>
-          <p:nvPr>
-            <p:ph type="subTitle" idx="1"/>
-          </p:nvPr>
-        </p:nvSpPr>
-        <p:spPr/>
-        <p:txBody>
-          <a:bodyPr/>
-          <a:lstStyle/>
-          <a:p>
-            <a:r>
-              <a:rPr lang="en-US" dirty="0"/>
-              <a:t>Ready 2019</a:t>
+              <a:t>Winter 2019</a:t>
             </a:r>
           </a:p>
         </p:txBody>
@@ -7143,7 +7152,7 @@
           <a:p>
             <a:r>
               <a:rPr lang="en-US" dirty="0"/>
-              <a:t>Dashboard Challenge</a:t>
+              <a:t>Dashboard &amp; Insights Challenge</a:t>
             </a:r>
           </a:p>
         </p:txBody>

</xml_diff>

<commit_message>
Updated the AKS deployment to use ARM template and removed terraform
</commit_message>
<xml_diff>
--- a/Student/Guides/Challenges.pptx
+++ b/Student/Guides/Challenges.pptx
@@ -599,7 +599,7 @@
           <a:p>
             <a:fld id="{53D76E38-EB4B-425D-87E0-B33791D2CD91}" type="datetimeFigureOut">
               <a:rPr lang="en-US" smtClean="0"/>
-              <a:t>1/30/2019</a:t>
+              <a:t>6/24/2019</a:t>
             </a:fld>
             <a:endParaRPr lang="en-US"/>
           </a:p>
@@ -1265,7 +1265,7 @@
           <a:p>
             <a:fld id="{3E3C2F32-47E1-4D90-8C64-89D7BCB0B356}" type="datetimeFigureOut">
               <a:rPr lang="en-US" smtClean="0"/>
-              <a:t>1/30/2019</a:t>
+              <a:t>6/24/2019</a:t>
             </a:fld>
             <a:endParaRPr lang="en-US"/>
           </a:p>
@@ -1463,7 +1463,7 @@
           <a:p>
             <a:fld id="{3E3C2F32-47E1-4D90-8C64-89D7BCB0B356}" type="datetimeFigureOut">
               <a:rPr lang="en-US" smtClean="0"/>
-              <a:t>1/30/2019</a:t>
+              <a:t>6/24/2019</a:t>
             </a:fld>
             <a:endParaRPr lang="en-US"/>
           </a:p>
@@ -1671,7 +1671,7 @@
           <a:p>
             <a:fld id="{3E3C2F32-47E1-4D90-8C64-89D7BCB0B356}" type="datetimeFigureOut">
               <a:rPr lang="en-US" smtClean="0"/>
-              <a:t>1/30/2019</a:t>
+              <a:t>6/24/2019</a:t>
             </a:fld>
             <a:endParaRPr lang="en-US"/>
           </a:p>
@@ -1869,7 +1869,7 @@
           <a:p>
             <a:fld id="{3E3C2F32-47E1-4D90-8C64-89D7BCB0B356}" type="datetimeFigureOut">
               <a:rPr lang="en-US" smtClean="0"/>
-              <a:t>1/30/2019</a:t>
+              <a:t>6/24/2019</a:t>
             </a:fld>
             <a:endParaRPr lang="en-US"/>
           </a:p>
@@ -2144,7 +2144,7 @@
           <a:p>
             <a:fld id="{3E3C2F32-47E1-4D90-8C64-89D7BCB0B356}" type="datetimeFigureOut">
               <a:rPr lang="en-US" smtClean="0"/>
-              <a:t>1/30/2019</a:t>
+              <a:t>6/24/2019</a:t>
             </a:fld>
             <a:endParaRPr lang="en-US"/>
           </a:p>
@@ -2409,7 +2409,7 @@
           <a:p>
             <a:fld id="{3E3C2F32-47E1-4D90-8C64-89D7BCB0B356}" type="datetimeFigureOut">
               <a:rPr lang="en-US" smtClean="0"/>
-              <a:t>1/30/2019</a:t>
+              <a:t>6/24/2019</a:t>
             </a:fld>
             <a:endParaRPr lang="en-US"/>
           </a:p>
@@ -2821,7 +2821,7 @@
           <a:p>
             <a:fld id="{3E3C2F32-47E1-4D90-8C64-89D7BCB0B356}" type="datetimeFigureOut">
               <a:rPr lang="en-US" smtClean="0"/>
-              <a:t>1/30/2019</a:t>
+              <a:t>6/24/2019</a:t>
             </a:fld>
             <a:endParaRPr lang="en-US"/>
           </a:p>
@@ -2962,7 +2962,7 @@
           <a:p>
             <a:fld id="{3E3C2F32-47E1-4D90-8C64-89D7BCB0B356}" type="datetimeFigureOut">
               <a:rPr lang="en-US" smtClean="0"/>
-              <a:t>1/30/2019</a:t>
+              <a:t>6/24/2019</a:t>
             </a:fld>
             <a:endParaRPr lang="en-US"/>
           </a:p>
@@ -3075,7 +3075,7 @@
           <a:p>
             <a:fld id="{3E3C2F32-47E1-4D90-8C64-89D7BCB0B356}" type="datetimeFigureOut">
               <a:rPr lang="en-US" smtClean="0"/>
-              <a:t>1/30/2019</a:t>
+              <a:t>6/24/2019</a:t>
             </a:fld>
             <a:endParaRPr lang="en-US"/>
           </a:p>
@@ -3386,7 +3386,7 @@
           <a:p>
             <a:fld id="{3E3C2F32-47E1-4D90-8C64-89D7BCB0B356}" type="datetimeFigureOut">
               <a:rPr lang="en-US" smtClean="0"/>
-              <a:t>1/30/2019</a:t>
+              <a:t>6/24/2019</a:t>
             </a:fld>
             <a:endParaRPr lang="en-US"/>
           </a:p>
@@ -3674,7 +3674,7 @@
           <a:p>
             <a:fld id="{3E3C2F32-47E1-4D90-8C64-89D7BCB0B356}" type="datetimeFigureOut">
               <a:rPr lang="en-US" smtClean="0"/>
-              <a:t>1/30/2019</a:t>
+              <a:t>6/24/2019</a:t>
             </a:fld>
             <a:endParaRPr lang="en-US"/>
           </a:p>
@@ -3915,7 +3915,7 @@
           <a:p>
             <a:fld id="{3E3C2F32-47E1-4D90-8C64-89D7BCB0B356}" type="datetimeFigureOut">
               <a:rPr lang="en-US" smtClean="0"/>
-              <a:t>1/30/2019</a:t>
+              <a:t>6/24/2019</a:t>
             </a:fld>
             <a:endParaRPr lang="en-US"/>
           </a:p>
@@ -4392,7 +4392,7 @@
           <a:p>
             <a:r>
               <a:rPr lang="en-US" dirty="0"/>
-              <a:t>Winter 2019</a:t>
+              <a:t>2019</a:t>
             </a:r>
           </a:p>
         </p:txBody>

</xml_diff>

<commit_message>
Update alert automation challenge
added new powershell cmdlets and Action Rule
</commit_message>
<xml_diff>
--- a/Student/Guides/Challenges.pptx
+++ b/Student/Guides/Challenges.pptx
@@ -599,7 +599,7 @@
           <a:p>
             <a:fld id="{53D76E38-EB4B-425D-87E0-B33791D2CD91}" type="datetimeFigureOut">
               <a:rPr lang="en-US" smtClean="0"/>
-              <a:t>6/24/2019</a:t>
+              <a:t>6/25/2019</a:t>
             </a:fld>
             <a:endParaRPr lang="en-US"/>
           </a:p>
@@ -1265,7 +1265,7 @@
           <a:p>
             <a:fld id="{3E3C2F32-47E1-4D90-8C64-89D7BCB0B356}" type="datetimeFigureOut">
               <a:rPr lang="en-US" smtClean="0"/>
-              <a:t>6/24/2019</a:t>
+              <a:t>6/25/2019</a:t>
             </a:fld>
             <a:endParaRPr lang="en-US"/>
           </a:p>
@@ -1463,7 +1463,7 @@
           <a:p>
             <a:fld id="{3E3C2F32-47E1-4D90-8C64-89D7BCB0B356}" type="datetimeFigureOut">
               <a:rPr lang="en-US" smtClean="0"/>
-              <a:t>6/24/2019</a:t>
+              <a:t>6/25/2019</a:t>
             </a:fld>
             <a:endParaRPr lang="en-US"/>
           </a:p>
@@ -1671,7 +1671,7 @@
           <a:p>
             <a:fld id="{3E3C2F32-47E1-4D90-8C64-89D7BCB0B356}" type="datetimeFigureOut">
               <a:rPr lang="en-US" smtClean="0"/>
-              <a:t>6/24/2019</a:t>
+              <a:t>6/25/2019</a:t>
             </a:fld>
             <a:endParaRPr lang="en-US"/>
           </a:p>
@@ -1869,7 +1869,7 @@
           <a:p>
             <a:fld id="{3E3C2F32-47E1-4D90-8C64-89D7BCB0B356}" type="datetimeFigureOut">
               <a:rPr lang="en-US" smtClean="0"/>
-              <a:t>6/24/2019</a:t>
+              <a:t>6/25/2019</a:t>
             </a:fld>
             <a:endParaRPr lang="en-US"/>
           </a:p>
@@ -2144,7 +2144,7 @@
           <a:p>
             <a:fld id="{3E3C2F32-47E1-4D90-8C64-89D7BCB0B356}" type="datetimeFigureOut">
               <a:rPr lang="en-US" smtClean="0"/>
-              <a:t>6/24/2019</a:t>
+              <a:t>6/25/2019</a:t>
             </a:fld>
             <a:endParaRPr lang="en-US"/>
           </a:p>
@@ -2409,7 +2409,7 @@
           <a:p>
             <a:fld id="{3E3C2F32-47E1-4D90-8C64-89D7BCB0B356}" type="datetimeFigureOut">
               <a:rPr lang="en-US" smtClean="0"/>
-              <a:t>6/24/2019</a:t>
+              <a:t>6/25/2019</a:t>
             </a:fld>
             <a:endParaRPr lang="en-US"/>
           </a:p>
@@ -2821,7 +2821,7 @@
           <a:p>
             <a:fld id="{3E3C2F32-47E1-4D90-8C64-89D7BCB0B356}" type="datetimeFigureOut">
               <a:rPr lang="en-US" smtClean="0"/>
-              <a:t>6/24/2019</a:t>
+              <a:t>6/25/2019</a:t>
             </a:fld>
             <a:endParaRPr lang="en-US"/>
           </a:p>
@@ -2962,7 +2962,7 @@
           <a:p>
             <a:fld id="{3E3C2F32-47E1-4D90-8C64-89D7BCB0B356}" type="datetimeFigureOut">
               <a:rPr lang="en-US" smtClean="0"/>
-              <a:t>6/24/2019</a:t>
+              <a:t>6/25/2019</a:t>
             </a:fld>
             <a:endParaRPr lang="en-US"/>
           </a:p>
@@ -3075,7 +3075,7 @@
           <a:p>
             <a:fld id="{3E3C2F32-47E1-4D90-8C64-89D7BCB0B356}" type="datetimeFigureOut">
               <a:rPr lang="en-US" smtClean="0"/>
-              <a:t>6/24/2019</a:t>
+              <a:t>6/25/2019</a:t>
             </a:fld>
             <a:endParaRPr lang="en-US"/>
           </a:p>
@@ -3386,7 +3386,7 @@
           <a:p>
             <a:fld id="{3E3C2F32-47E1-4D90-8C64-89D7BCB0B356}" type="datetimeFigureOut">
               <a:rPr lang="en-US" smtClean="0"/>
-              <a:t>6/24/2019</a:t>
+              <a:t>6/25/2019</a:t>
             </a:fld>
             <a:endParaRPr lang="en-US"/>
           </a:p>
@@ -3674,7 +3674,7 @@
           <a:p>
             <a:fld id="{3E3C2F32-47E1-4D90-8C64-89D7BCB0B356}" type="datetimeFigureOut">
               <a:rPr lang="en-US" smtClean="0"/>
-              <a:t>6/24/2019</a:t>
+              <a:t>6/25/2019</a:t>
             </a:fld>
             <a:endParaRPr lang="en-US"/>
           </a:p>
@@ -3915,7 +3915,7 @@
           <a:p>
             <a:fld id="{3E3C2F32-47E1-4D90-8C64-89D7BCB0B356}" type="datetimeFigureOut">
               <a:rPr lang="en-US" smtClean="0"/>
-              <a:t>6/24/2019</a:t>
+              <a:t>6/25/2019</a:t>
             </a:fld>
             <a:endParaRPr lang="en-US"/>
           </a:p>
@@ -5811,7 +5811,7 @@
           <a:p>
             <a:r>
               <a:rPr lang="en-US" sz="2000" dirty="0"/>
-              <a:t>Verify you have new Monitor Alert Rules in the Portal or from the command line (sample command is in the deployment script)</a:t>
+              <a:t>Verify you have new Monitor Alert Rules in the Portal or from the command line (sample command is in the PowerShell deployment script using new Az Monitor cmdlets)</a:t>
             </a:r>
           </a:p>
           <a:p>
@@ -5837,7 +5837,13 @@
           <a:p>
             <a:r>
               <a:rPr lang="en-US" sz="2000" dirty="0"/>
-              <a:t>First team to me a screenshot of the new Alert Rules wins the challenge!!</a:t>
+              <a:t>Create a new Action Rule that suppress alerts from the scale set and virtual machines on Saturday and Sunday</a:t>
+            </a:r>
+          </a:p>
+          <a:p>
+            <a:r>
+              <a:rPr lang="en-US" sz="2000" dirty="0"/>
+              <a:t>First team to me a screenshot of the new Alert Rules and Action Rule wins the challenge!!</a:t>
             </a:r>
           </a:p>
           <a:p>

</xml_diff>